<commit_message>
Some refinements following the blog post
</commit_message>
<xml_diff>
--- a/images/banner.pptx
+++ b/images/banner.pptx
@@ -6,6 +6,7 @@
   </p:sldMasterIdLst>
   <p:sldIdLst>
     <p:sldId id="258" r:id="rId2"/>
+    <p:sldId id="259" r:id="rId3"/>
   </p:sldIdLst>
   <p:sldSz cx="12192000" cy="6858000"/>
   <p:notesSz cx="6858000" cy="9144000"/>
@@ -261,7 +262,7 @@
           <a:p>
             <a:fld id="{5108202D-0509-4C49-8C3D-2E011E7D5E65}" type="datetimeFigureOut">
               <a:rPr lang="en-GB" smtClean="0"/>
-              <a:t>23/01/2022</a:t>
+              <a:t>24/01/2022</a:t>
             </a:fld>
             <a:endParaRPr lang="en-GB"/>
           </a:p>
@@ -461,7 +462,7 @@
           <a:p>
             <a:fld id="{5108202D-0509-4C49-8C3D-2E011E7D5E65}" type="datetimeFigureOut">
               <a:rPr lang="en-GB" smtClean="0"/>
-              <a:t>23/01/2022</a:t>
+              <a:t>24/01/2022</a:t>
             </a:fld>
             <a:endParaRPr lang="en-GB"/>
           </a:p>
@@ -671,7 +672,7 @@
           <a:p>
             <a:fld id="{5108202D-0509-4C49-8C3D-2E011E7D5E65}" type="datetimeFigureOut">
               <a:rPr lang="en-GB" smtClean="0"/>
-              <a:t>23/01/2022</a:t>
+              <a:t>24/01/2022</a:t>
             </a:fld>
             <a:endParaRPr lang="en-GB"/>
           </a:p>
@@ -871,7 +872,7 @@
           <a:p>
             <a:fld id="{5108202D-0509-4C49-8C3D-2E011E7D5E65}" type="datetimeFigureOut">
               <a:rPr lang="en-GB" smtClean="0"/>
-              <a:t>23/01/2022</a:t>
+              <a:t>24/01/2022</a:t>
             </a:fld>
             <a:endParaRPr lang="en-GB"/>
           </a:p>
@@ -1147,7 +1148,7 @@
           <a:p>
             <a:fld id="{5108202D-0509-4C49-8C3D-2E011E7D5E65}" type="datetimeFigureOut">
               <a:rPr lang="en-GB" smtClean="0"/>
-              <a:t>23/01/2022</a:t>
+              <a:t>24/01/2022</a:t>
             </a:fld>
             <a:endParaRPr lang="en-GB"/>
           </a:p>
@@ -1415,7 +1416,7 @@
           <a:p>
             <a:fld id="{5108202D-0509-4C49-8C3D-2E011E7D5E65}" type="datetimeFigureOut">
               <a:rPr lang="en-GB" smtClean="0"/>
-              <a:t>23/01/2022</a:t>
+              <a:t>24/01/2022</a:t>
             </a:fld>
             <a:endParaRPr lang="en-GB"/>
           </a:p>
@@ -1830,7 +1831,7 @@
           <a:p>
             <a:fld id="{5108202D-0509-4C49-8C3D-2E011E7D5E65}" type="datetimeFigureOut">
               <a:rPr lang="en-GB" smtClean="0"/>
-              <a:t>23/01/2022</a:t>
+              <a:t>24/01/2022</a:t>
             </a:fld>
             <a:endParaRPr lang="en-GB"/>
           </a:p>
@@ -1972,7 +1973,7 @@
           <a:p>
             <a:fld id="{5108202D-0509-4C49-8C3D-2E011E7D5E65}" type="datetimeFigureOut">
               <a:rPr lang="en-GB" smtClean="0"/>
-              <a:t>23/01/2022</a:t>
+              <a:t>24/01/2022</a:t>
             </a:fld>
             <a:endParaRPr lang="en-GB"/>
           </a:p>
@@ -2085,7 +2086,7 @@
           <a:p>
             <a:fld id="{5108202D-0509-4C49-8C3D-2E011E7D5E65}" type="datetimeFigureOut">
               <a:rPr lang="en-GB" smtClean="0"/>
-              <a:t>23/01/2022</a:t>
+              <a:t>24/01/2022</a:t>
             </a:fld>
             <a:endParaRPr lang="en-GB"/>
           </a:p>
@@ -2398,7 +2399,7 @@
           <a:p>
             <a:fld id="{5108202D-0509-4C49-8C3D-2E011E7D5E65}" type="datetimeFigureOut">
               <a:rPr lang="en-GB" smtClean="0"/>
-              <a:t>23/01/2022</a:t>
+              <a:t>24/01/2022</a:t>
             </a:fld>
             <a:endParaRPr lang="en-GB"/>
           </a:p>
@@ -2687,7 +2688,7 @@
           <a:p>
             <a:fld id="{5108202D-0509-4C49-8C3D-2E011E7D5E65}" type="datetimeFigureOut">
               <a:rPr lang="en-GB" smtClean="0"/>
-              <a:t>23/01/2022</a:t>
+              <a:t>24/01/2022</a:t>
             </a:fld>
             <a:endParaRPr lang="en-GB"/>
           </a:p>
@@ -2930,7 +2931,7 @@
           <a:p>
             <a:fld id="{5108202D-0509-4C49-8C3D-2E011E7D5E65}" type="datetimeFigureOut">
               <a:rPr lang="en-GB" smtClean="0"/>
-              <a:t>23/01/2022</a:t>
+              <a:t>24/01/2022</a:t>
             </a:fld>
             <a:endParaRPr lang="en-GB"/>
           </a:p>
@@ -3914,8 +3915,8 @@
         </p:blipFill>
         <p:spPr>
           <a:xfrm>
-            <a:off x="9389832" y="4888514"/>
-            <a:ext cx="996354" cy="996354"/>
+            <a:off x="9466944" y="4902685"/>
+            <a:ext cx="842127" cy="842127"/>
           </a:xfrm>
           <a:prstGeom prst="rect">
             <a:avLst/>
@@ -3968,10 +3969,989 @@
           </a:p>
         </p:txBody>
       </p:sp>
+      <p:sp>
+        <p:nvSpPr>
+          <p:cNvPr id="25" name="Segno di addizione 24">
+            <a:extLst>
+              <a:ext uri="{FF2B5EF4-FFF2-40B4-BE49-F238E27FC236}">
+                <a16:creationId xmlns:a16="http://schemas.microsoft.com/office/drawing/2014/main" id="{84F28705-52C4-4DD6-BDDF-1E00DEE46CDB}"/>
+              </a:ext>
+            </a:extLst>
+          </p:cNvPr>
+          <p:cNvSpPr/>
+          <p:nvPr/>
+        </p:nvSpPr>
+        <p:spPr>
+          <a:xfrm>
+            <a:off x="9716032" y="5883513"/>
+            <a:ext cx="343949" cy="293615"/>
+          </a:xfrm>
+          <a:prstGeom prst="mathPlus">
+            <a:avLst/>
+          </a:prstGeom>
+        </p:spPr>
+        <p:style>
+          <a:lnRef idx="2">
+            <a:schemeClr val="accent1">
+              <a:shade val="50000"/>
+            </a:schemeClr>
+          </a:lnRef>
+          <a:fillRef idx="1">
+            <a:schemeClr val="accent1"/>
+          </a:fillRef>
+          <a:effectRef idx="0">
+            <a:schemeClr val="accent1"/>
+          </a:effectRef>
+          <a:fontRef idx="minor">
+            <a:schemeClr val="lt1"/>
+          </a:fontRef>
+        </p:style>
+        <p:txBody>
+          <a:bodyPr rtlCol="0" anchor="ctr"/>
+          <a:lstStyle/>
+          <a:p>
+            <a:pPr algn="ctr"/>
+            <a:endParaRPr lang="en-GB"/>
+          </a:p>
+        </p:txBody>
+      </p:sp>
+      <p:pic>
+        <p:nvPicPr>
+          <p:cNvPr id="7" name="Immagine 6">
+            <a:extLst>
+              <a:ext uri="{FF2B5EF4-FFF2-40B4-BE49-F238E27FC236}">
+                <a16:creationId xmlns:a16="http://schemas.microsoft.com/office/drawing/2014/main" id="{EED53F25-8C07-49E9-AA54-53B2B946E0E4}"/>
+              </a:ext>
+            </a:extLst>
+          </p:cNvPr>
+          <p:cNvPicPr>
+            <a:picLocks noChangeAspect="1"/>
+          </p:cNvPicPr>
+          <p:nvPr/>
+        </p:nvPicPr>
+        <p:blipFill>
+          <a:blip r:embed="rId11">
+            <a:extLst>
+              <a:ext uri="{28A0092B-C50C-407E-A947-70E740481C1C}">
+                <a14:useLocalDpi xmlns:a14="http://schemas.microsoft.com/office/drawing/2010/main" val="0"/>
+              </a:ext>
+            </a:extLst>
+          </a:blip>
+          <a:stretch>
+            <a:fillRect/>
+          </a:stretch>
+        </p:blipFill>
+        <p:spPr>
+          <a:xfrm>
+            <a:off x="849541" y="5192911"/>
+            <a:ext cx="1396401" cy="640927"/>
+          </a:xfrm>
+          <a:prstGeom prst="rect">
+            <a:avLst/>
+          </a:prstGeom>
+        </p:spPr>
+      </p:pic>
+      <p:sp>
+        <p:nvSpPr>
+          <p:cNvPr id="26" name="Segno di addizione 25">
+            <a:extLst>
+              <a:ext uri="{FF2B5EF4-FFF2-40B4-BE49-F238E27FC236}">
+                <a16:creationId xmlns:a16="http://schemas.microsoft.com/office/drawing/2014/main" id="{642079AD-9361-4D2B-9781-08CB9DD21BDD}"/>
+              </a:ext>
+            </a:extLst>
+          </p:cNvPr>
+          <p:cNvSpPr/>
+          <p:nvPr/>
+        </p:nvSpPr>
+        <p:spPr>
+          <a:xfrm>
+            <a:off x="1308499" y="4814197"/>
+            <a:ext cx="343949" cy="293615"/>
+          </a:xfrm>
+          <a:prstGeom prst="mathPlus">
+            <a:avLst/>
+          </a:prstGeom>
+        </p:spPr>
+        <p:style>
+          <a:lnRef idx="2">
+            <a:schemeClr val="accent1">
+              <a:shade val="50000"/>
+            </a:schemeClr>
+          </a:lnRef>
+          <a:fillRef idx="1">
+            <a:schemeClr val="accent1"/>
+          </a:fillRef>
+          <a:effectRef idx="0">
+            <a:schemeClr val="accent1"/>
+          </a:effectRef>
+          <a:fontRef idx="minor">
+            <a:schemeClr val="lt1"/>
+          </a:fontRef>
+        </p:style>
+        <p:txBody>
+          <a:bodyPr rtlCol="0" anchor="ctr"/>
+          <a:lstStyle/>
+          <a:p>
+            <a:pPr algn="ctr"/>
+            <a:endParaRPr lang="en-GB"/>
+          </a:p>
+        </p:txBody>
+      </p:sp>
+      <p:pic>
+        <p:nvPicPr>
+          <p:cNvPr id="9" name="Immagine 8" descr="Immagine che contiene testo, orologio, clipart&#10;&#10;Descrizione generata automaticamente">
+            <a:extLst>
+              <a:ext uri="{FF2B5EF4-FFF2-40B4-BE49-F238E27FC236}">
+                <a16:creationId xmlns:a16="http://schemas.microsoft.com/office/drawing/2014/main" id="{ED796E7F-0CBA-41EC-9C1F-3EEB3071E327}"/>
+              </a:ext>
+            </a:extLst>
+          </p:cNvPr>
+          <p:cNvPicPr>
+            <a:picLocks noChangeAspect="1"/>
+          </p:cNvPicPr>
+          <p:nvPr/>
+        </p:nvPicPr>
+        <p:blipFill>
+          <a:blip r:embed="rId12">
+            <a:extLst>
+              <a:ext uri="{28A0092B-C50C-407E-A947-70E740481C1C}">
+                <a14:useLocalDpi xmlns:a14="http://schemas.microsoft.com/office/drawing/2010/main" val="0"/>
+              </a:ext>
+            </a:extLst>
+          </a:blip>
+          <a:stretch>
+            <a:fillRect/>
+          </a:stretch>
+        </p:blipFill>
+        <p:spPr>
+          <a:xfrm>
+            <a:off x="9120236" y="6315829"/>
+            <a:ext cx="1535542" cy="356328"/>
+          </a:xfrm>
+          <a:prstGeom prst="rect">
+            <a:avLst/>
+          </a:prstGeom>
+        </p:spPr>
+      </p:pic>
     </p:spTree>
     <p:extLst>
       <p:ext uri="{BB962C8B-B14F-4D97-AF65-F5344CB8AC3E}">
         <p14:creationId xmlns:p14="http://schemas.microsoft.com/office/powerpoint/2010/main" val="471503852"/>
+      </p:ext>
+    </p:extLst>
+  </p:cSld>
+  <p:clrMapOvr>
+    <a:masterClrMapping/>
+  </p:clrMapOvr>
+</p:sld>
+</file>
+
+<file path=ppt/slides/slide2.xml><?xml version="1.0" encoding="utf-8"?>
+<p:sld xmlns:a="http://schemas.openxmlformats.org/drawingml/2006/main" xmlns:r="http://schemas.openxmlformats.org/officeDocument/2006/relationships" xmlns:p="http://schemas.openxmlformats.org/presentationml/2006/main">
+  <p:cSld>
+    <p:spTree>
+      <p:nvGrpSpPr>
+        <p:cNvPr id="1" name=""/>
+        <p:cNvGrpSpPr/>
+        <p:nvPr/>
+      </p:nvGrpSpPr>
+      <p:grpSpPr>
+        <a:xfrm>
+          <a:off x="0" y="0"/>
+          <a:ext cx="0" cy="0"/>
+          <a:chOff x="0" y="0"/>
+          <a:chExt cx="0" cy="0"/>
+        </a:xfrm>
+      </p:grpSpPr>
+      <p:pic>
+        <p:nvPicPr>
+          <p:cNvPr id="5" name="Immagine 4">
+            <a:extLst>
+              <a:ext uri="{FF2B5EF4-FFF2-40B4-BE49-F238E27FC236}">
+                <a16:creationId xmlns:a16="http://schemas.microsoft.com/office/drawing/2014/main" id="{2334829B-96A8-4B41-A7E0-792E1145AC0C}"/>
+              </a:ext>
+            </a:extLst>
+          </p:cNvPr>
+          <p:cNvPicPr>
+            <a:picLocks noChangeAspect="1"/>
+          </p:cNvPicPr>
+          <p:nvPr/>
+        </p:nvPicPr>
+        <p:blipFill>
+          <a:blip r:embed="rId2">
+            <a:extLst>
+              <a:ext uri="{28A0092B-C50C-407E-A947-70E740481C1C}">
+                <a14:useLocalDpi xmlns:a14="http://schemas.microsoft.com/office/drawing/2010/main" val="0"/>
+              </a:ext>
+            </a:extLst>
+          </a:blip>
+          <a:stretch>
+            <a:fillRect/>
+          </a:stretch>
+        </p:blipFill>
+        <p:spPr>
+          <a:xfrm>
+            <a:off x="1395388" y="1491646"/>
+            <a:ext cx="1785938" cy="1514475"/>
+          </a:xfrm>
+          <a:prstGeom prst="rect">
+            <a:avLst/>
+          </a:prstGeom>
+        </p:spPr>
+      </p:pic>
+      <p:pic>
+        <p:nvPicPr>
+          <p:cNvPr id="15" name="Immagine 14">
+            <a:extLst>
+              <a:ext uri="{FF2B5EF4-FFF2-40B4-BE49-F238E27FC236}">
+                <a16:creationId xmlns:a16="http://schemas.microsoft.com/office/drawing/2014/main" id="{7A57245F-43F6-4D0A-A603-0AD53B9EC91A}"/>
+              </a:ext>
+            </a:extLst>
+          </p:cNvPr>
+          <p:cNvPicPr>
+            <a:picLocks noChangeAspect="1"/>
+          </p:cNvPicPr>
+          <p:nvPr/>
+        </p:nvPicPr>
+        <p:blipFill>
+          <a:blip r:embed="rId3">
+            <a:extLst>
+              <a:ext uri="{28A0092B-C50C-407E-A947-70E740481C1C}">
+                <a14:useLocalDpi xmlns:a14="http://schemas.microsoft.com/office/drawing/2010/main" val="0"/>
+              </a:ext>
+            </a:extLst>
+          </a:blip>
+          <a:stretch>
+            <a:fillRect/>
+          </a:stretch>
+        </p:blipFill>
+        <p:spPr>
+          <a:xfrm>
+            <a:off x="5651691" y="4915938"/>
+            <a:ext cx="888617" cy="925241"/>
+          </a:xfrm>
+          <a:prstGeom prst="rect">
+            <a:avLst/>
+          </a:prstGeom>
+        </p:spPr>
+      </p:pic>
+      <p:pic>
+        <p:nvPicPr>
+          <p:cNvPr id="17" name="Immagine 16">
+            <a:extLst>
+              <a:ext uri="{FF2B5EF4-FFF2-40B4-BE49-F238E27FC236}">
+                <a16:creationId xmlns:a16="http://schemas.microsoft.com/office/drawing/2014/main" id="{7CA7547B-3D0F-47AF-BC8E-7565DC3F7342}"/>
+              </a:ext>
+            </a:extLst>
+          </p:cNvPr>
+          <p:cNvPicPr>
+            <a:picLocks noChangeAspect="1"/>
+          </p:cNvPicPr>
+          <p:nvPr/>
+        </p:nvPicPr>
+        <p:blipFill>
+          <a:blip r:embed="rId4">
+            <a:extLst>
+              <a:ext uri="{28A0092B-C50C-407E-A947-70E740481C1C}">
+                <a14:useLocalDpi xmlns:a14="http://schemas.microsoft.com/office/drawing/2010/main" val="0"/>
+              </a:ext>
+            </a:extLst>
+          </a:blip>
+          <a:stretch>
+            <a:fillRect/>
+          </a:stretch>
+        </p:blipFill>
+        <p:spPr>
+          <a:xfrm>
+            <a:off x="8468623" y="1238726"/>
+            <a:ext cx="2182813" cy="1365250"/>
+          </a:xfrm>
+          <a:prstGeom prst="rect">
+            <a:avLst/>
+          </a:prstGeom>
+        </p:spPr>
+      </p:pic>
+      <p:pic>
+        <p:nvPicPr>
+          <p:cNvPr id="13" name="Immagine 12">
+            <a:extLst>
+              <a:ext uri="{FF2B5EF4-FFF2-40B4-BE49-F238E27FC236}">
+                <a16:creationId xmlns:a16="http://schemas.microsoft.com/office/drawing/2014/main" id="{1C032AEF-1B34-4558-B387-2E4301BCB6CE}"/>
+              </a:ext>
+            </a:extLst>
+          </p:cNvPr>
+          <p:cNvPicPr>
+            <a:picLocks noChangeAspect="1"/>
+          </p:cNvPicPr>
+          <p:nvPr/>
+        </p:nvPicPr>
+        <p:blipFill>
+          <a:blip r:embed="rId5">
+            <a:extLst>
+              <a:ext uri="{28A0092B-C50C-407E-A947-70E740481C1C}">
+                <a14:useLocalDpi xmlns:a14="http://schemas.microsoft.com/office/drawing/2010/main" val="0"/>
+              </a:ext>
+            </a:extLst>
+          </a:blip>
+          <a:stretch>
+            <a:fillRect/>
+          </a:stretch>
+        </p:blipFill>
+        <p:spPr>
+          <a:xfrm>
+            <a:off x="8468623" y="3367324"/>
+            <a:ext cx="1078862" cy="955676"/>
+          </a:xfrm>
+          <a:prstGeom prst="rect">
+            <a:avLst/>
+          </a:prstGeom>
+        </p:spPr>
+      </p:pic>
+      <p:pic>
+        <p:nvPicPr>
+          <p:cNvPr id="3" name="Immagine 2">
+            <a:extLst>
+              <a:ext uri="{FF2B5EF4-FFF2-40B4-BE49-F238E27FC236}">
+                <a16:creationId xmlns:a16="http://schemas.microsoft.com/office/drawing/2014/main" id="{A47108AD-AA1A-4487-B2E6-82FD2C980A74}"/>
+              </a:ext>
+            </a:extLst>
+          </p:cNvPr>
+          <p:cNvPicPr>
+            <a:picLocks noChangeAspect="1"/>
+          </p:cNvPicPr>
+          <p:nvPr/>
+        </p:nvPicPr>
+        <p:blipFill>
+          <a:blip r:embed="rId6">
+            <a:extLst>
+              <a:ext uri="{28A0092B-C50C-407E-A947-70E740481C1C}">
+                <a14:useLocalDpi xmlns:a14="http://schemas.microsoft.com/office/drawing/2010/main" val="0"/>
+              </a:ext>
+            </a:extLst>
+          </a:blip>
+          <a:stretch>
+            <a:fillRect/>
+          </a:stretch>
+        </p:blipFill>
+        <p:spPr>
+          <a:xfrm>
+            <a:off x="26238" y="3727314"/>
+            <a:ext cx="3543300" cy="1295400"/>
+          </a:xfrm>
+          <a:prstGeom prst="rect">
+            <a:avLst/>
+          </a:prstGeom>
+        </p:spPr>
+      </p:pic>
+      <p:grpSp>
+        <p:nvGrpSpPr>
+          <p:cNvPr id="12" name="Gruppo 11">
+            <a:extLst>
+              <a:ext uri="{FF2B5EF4-FFF2-40B4-BE49-F238E27FC236}">
+                <a16:creationId xmlns:a16="http://schemas.microsoft.com/office/drawing/2014/main" id="{EA8CBCB8-B5E7-4BDA-ABAB-EDA59873685F}"/>
+              </a:ext>
+            </a:extLst>
+          </p:cNvPr>
+          <p:cNvGrpSpPr/>
+          <p:nvPr/>
+        </p:nvGrpSpPr>
+        <p:grpSpPr>
+          <a:xfrm>
+            <a:off x="5053878" y="1760178"/>
+            <a:ext cx="2178422" cy="2393606"/>
+            <a:chOff x="4656795" y="918127"/>
+            <a:chExt cx="2936396" cy="3525367"/>
+          </a:xfrm>
+        </p:grpSpPr>
+        <p:pic>
+          <p:nvPicPr>
+            <p:cNvPr id="14" name="Immagine 13" descr="Immagine che contiene testo&#10;&#10;Descrizione generata automaticamente">
+              <a:extLst>
+                <a:ext uri="{FF2B5EF4-FFF2-40B4-BE49-F238E27FC236}">
+                  <a16:creationId xmlns:a16="http://schemas.microsoft.com/office/drawing/2014/main" id="{B1E0A3DD-8093-44DF-9E1B-293D9043ABD5}"/>
+                </a:ext>
+              </a:extLst>
+            </p:cNvPr>
+            <p:cNvPicPr>
+              <a:picLocks noChangeAspect="1"/>
+            </p:cNvPicPr>
+            <p:nvPr/>
+          </p:nvPicPr>
+          <p:blipFill>
+            <a:blip r:embed="rId7">
+              <a:extLst>
+                <a:ext uri="{28A0092B-C50C-407E-A947-70E740481C1C}">
+                  <a14:useLocalDpi xmlns:a14="http://schemas.microsoft.com/office/drawing/2010/main" val="0"/>
+                </a:ext>
+              </a:extLst>
+            </a:blip>
+            <a:stretch>
+              <a:fillRect/>
+            </a:stretch>
+          </p:blipFill>
+          <p:spPr>
+            <a:xfrm>
+              <a:off x="6292122" y="2865842"/>
+              <a:ext cx="1301069" cy="1577652"/>
+            </a:xfrm>
+            <a:prstGeom prst="rect">
+              <a:avLst/>
+            </a:prstGeom>
+          </p:spPr>
+        </p:pic>
+        <p:pic>
+          <p:nvPicPr>
+            <p:cNvPr id="16" name="Immagine 15" descr="Immagine che contiene clipart&#10;&#10;Descrizione generata automaticamente">
+              <a:extLst>
+                <a:ext uri="{FF2B5EF4-FFF2-40B4-BE49-F238E27FC236}">
+                  <a16:creationId xmlns:a16="http://schemas.microsoft.com/office/drawing/2014/main" id="{062A3ED6-14C0-4366-AB8A-6916347AEE84}"/>
+                </a:ext>
+              </a:extLst>
+            </p:cNvPr>
+            <p:cNvPicPr>
+              <a:picLocks noChangeAspect="1"/>
+            </p:cNvPicPr>
+            <p:nvPr/>
+          </p:nvPicPr>
+          <p:blipFill>
+            <a:blip r:embed="rId8">
+              <a:extLst>
+                <a:ext uri="{28A0092B-C50C-407E-A947-70E740481C1C}">
+                  <a14:useLocalDpi xmlns:a14="http://schemas.microsoft.com/office/drawing/2010/main" val="0"/>
+                </a:ext>
+              </a:extLst>
+            </a:blip>
+            <a:stretch>
+              <a:fillRect/>
+            </a:stretch>
+          </p:blipFill>
+          <p:spPr>
+            <a:xfrm>
+              <a:off x="4656795" y="3138808"/>
+              <a:ext cx="966755" cy="1184066"/>
+            </a:xfrm>
+            <a:prstGeom prst="rect">
+              <a:avLst/>
+            </a:prstGeom>
+          </p:spPr>
+        </p:pic>
+        <p:pic>
+          <p:nvPicPr>
+            <p:cNvPr id="18" name="Immagine 17" descr="Immagine che contiene testo, segnale&#10;&#10;Descrizione generata automaticamente">
+              <a:extLst>
+                <a:ext uri="{FF2B5EF4-FFF2-40B4-BE49-F238E27FC236}">
+                  <a16:creationId xmlns:a16="http://schemas.microsoft.com/office/drawing/2014/main" id="{3146C2D4-F620-4DBA-B7BF-BBB6A551946D}"/>
+                </a:ext>
+              </a:extLst>
+            </p:cNvPr>
+            <p:cNvPicPr>
+              <a:picLocks noChangeAspect="1"/>
+            </p:cNvPicPr>
+            <p:nvPr/>
+          </p:nvPicPr>
+          <p:blipFill>
+            <a:blip r:embed="rId9">
+              <a:extLst>
+                <a:ext uri="{28A0092B-C50C-407E-A947-70E740481C1C}">
+                  <a14:useLocalDpi xmlns:a14="http://schemas.microsoft.com/office/drawing/2010/main" val="0"/>
+                </a:ext>
+              </a:extLst>
+            </a:blip>
+            <a:stretch>
+              <a:fillRect/>
+            </a:stretch>
+          </p:blipFill>
+          <p:spPr>
+            <a:xfrm>
+              <a:off x="5015885" y="918127"/>
+              <a:ext cx="1638896" cy="2285206"/>
+            </a:xfrm>
+            <a:prstGeom prst="rect">
+              <a:avLst/>
+            </a:prstGeom>
+          </p:spPr>
+        </p:pic>
+      </p:grpSp>
+      <p:sp>
+        <p:nvSpPr>
+          <p:cNvPr id="2" name="Freccia in giù 1">
+            <a:extLst>
+              <a:ext uri="{FF2B5EF4-FFF2-40B4-BE49-F238E27FC236}">
+                <a16:creationId xmlns:a16="http://schemas.microsoft.com/office/drawing/2014/main" id="{CC7773BA-2038-4167-AA1E-EF2383C51598}"/>
+              </a:ext>
+            </a:extLst>
+          </p:cNvPr>
+          <p:cNvSpPr/>
+          <p:nvPr/>
+        </p:nvSpPr>
+        <p:spPr>
+          <a:xfrm rot="5926018">
+            <a:off x="3723818" y="1955920"/>
+            <a:ext cx="532661" cy="585926"/>
+          </a:xfrm>
+          <a:prstGeom prst="downArrow">
+            <a:avLst/>
+          </a:prstGeom>
+        </p:spPr>
+        <p:style>
+          <a:lnRef idx="2">
+            <a:schemeClr val="accent1">
+              <a:shade val="50000"/>
+            </a:schemeClr>
+          </a:lnRef>
+          <a:fillRef idx="1">
+            <a:schemeClr val="accent1"/>
+          </a:fillRef>
+          <a:effectRef idx="0">
+            <a:schemeClr val="accent1"/>
+          </a:effectRef>
+          <a:fontRef idx="minor">
+            <a:schemeClr val="lt1"/>
+          </a:fontRef>
+        </p:style>
+        <p:txBody>
+          <a:bodyPr rtlCol="0" anchor="ctr"/>
+          <a:lstStyle/>
+          <a:p>
+            <a:pPr algn="ctr"/>
+            <a:endParaRPr lang="en-GB"/>
+          </a:p>
+        </p:txBody>
+      </p:sp>
+      <p:sp>
+        <p:nvSpPr>
+          <p:cNvPr id="19" name="Freccia in giù 18">
+            <a:extLst>
+              <a:ext uri="{FF2B5EF4-FFF2-40B4-BE49-F238E27FC236}">
+                <a16:creationId xmlns:a16="http://schemas.microsoft.com/office/drawing/2014/main" id="{D2EBD919-3DF7-4E11-9FA9-CA4FE9A24E43}"/>
+              </a:ext>
+            </a:extLst>
+          </p:cNvPr>
+          <p:cNvSpPr/>
+          <p:nvPr/>
+        </p:nvSpPr>
+        <p:spPr>
+          <a:xfrm rot="15677332">
+            <a:off x="7599707" y="1935376"/>
+            <a:ext cx="532661" cy="585926"/>
+          </a:xfrm>
+          <a:prstGeom prst="downArrow">
+            <a:avLst/>
+          </a:prstGeom>
+        </p:spPr>
+        <p:style>
+          <a:lnRef idx="2">
+            <a:schemeClr val="accent1">
+              <a:shade val="50000"/>
+            </a:schemeClr>
+          </a:lnRef>
+          <a:fillRef idx="1">
+            <a:schemeClr val="accent1"/>
+          </a:fillRef>
+          <a:effectRef idx="0">
+            <a:schemeClr val="accent1"/>
+          </a:effectRef>
+          <a:fontRef idx="minor">
+            <a:schemeClr val="lt1"/>
+          </a:fontRef>
+        </p:style>
+        <p:txBody>
+          <a:bodyPr rtlCol="0" anchor="ctr"/>
+          <a:lstStyle/>
+          <a:p>
+            <a:pPr algn="ctr"/>
+            <a:endParaRPr lang="en-GB"/>
+          </a:p>
+        </p:txBody>
+      </p:sp>
+      <p:sp>
+        <p:nvSpPr>
+          <p:cNvPr id="20" name="Freccia in giù 19">
+            <a:extLst>
+              <a:ext uri="{FF2B5EF4-FFF2-40B4-BE49-F238E27FC236}">
+                <a16:creationId xmlns:a16="http://schemas.microsoft.com/office/drawing/2014/main" id="{65459933-4D20-4CCE-8A08-7769FBBA5695}"/>
+              </a:ext>
+            </a:extLst>
+          </p:cNvPr>
+          <p:cNvSpPr/>
+          <p:nvPr/>
+        </p:nvSpPr>
+        <p:spPr>
+          <a:xfrm rot="17387567">
+            <a:off x="7652495" y="3376954"/>
+            <a:ext cx="532661" cy="585926"/>
+          </a:xfrm>
+          <a:prstGeom prst="downArrow">
+            <a:avLst/>
+          </a:prstGeom>
+        </p:spPr>
+        <p:style>
+          <a:lnRef idx="2">
+            <a:schemeClr val="accent1">
+              <a:shade val="50000"/>
+            </a:schemeClr>
+          </a:lnRef>
+          <a:fillRef idx="1">
+            <a:schemeClr val="accent1"/>
+          </a:fillRef>
+          <a:effectRef idx="0">
+            <a:schemeClr val="accent1"/>
+          </a:effectRef>
+          <a:fontRef idx="minor">
+            <a:schemeClr val="lt1"/>
+          </a:fontRef>
+        </p:style>
+        <p:txBody>
+          <a:bodyPr rtlCol="0" anchor="ctr"/>
+          <a:lstStyle/>
+          <a:p>
+            <a:pPr algn="ctr"/>
+            <a:endParaRPr lang="en-GB"/>
+          </a:p>
+        </p:txBody>
+      </p:sp>
+      <p:sp>
+        <p:nvSpPr>
+          <p:cNvPr id="21" name="Freccia in giù 20">
+            <a:extLst>
+              <a:ext uri="{FF2B5EF4-FFF2-40B4-BE49-F238E27FC236}">
+                <a16:creationId xmlns:a16="http://schemas.microsoft.com/office/drawing/2014/main" id="{9F844538-FF6A-4BC8-8158-10F85BD9C6A1}"/>
+              </a:ext>
+            </a:extLst>
+          </p:cNvPr>
+          <p:cNvSpPr/>
+          <p:nvPr/>
+        </p:nvSpPr>
+        <p:spPr>
+          <a:xfrm>
+            <a:off x="5796616" y="4145263"/>
+            <a:ext cx="532661" cy="585926"/>
+          </a:xfrm>
+          <a:prstGeom prst="downArrow">
+            <a:avLst/>
+          </a:prstGeom>
+        </p:spPr>
+        <p:style>
+          <a:lnRef idx="2">
+            <a:schemeClr val="accent1">
+              <a:shade val="50000"/>
+            </a:schemeClr>
+          </a:lnRef>
+          <a:fillRef idx="1">
+            <a:schemeClr val="accent1"/>
+          </a:fillRef>
+          <a:effectRef idx="0">
+            <a:schemeClr val="accent1"/>
+          </a:effectRef>
+          <a:fontRef idx="minor">
+            <a:schemeClr val="lt1"/>
+          </a:fontRef>
+        </p:style>
+        <p:txBody>
+          <a:bodyPr rtlCol="0" anchor="ctr"/>
+          <a:lstStyle/>
+          <a:p>
+            <a:pPr algn="ctr"/>
+            <a:endParaRPr lang="en-GB"/>
+          </a:p>
+        </p:txBody>
+      </p:sp>
+      <p:sp>
+        <p:nvSpPr>
+          <p:cNvPr id="23" name="Freccia in giù 22">
+            <a:extLst>
+              <a:ext uri="{FF2B5EF4-FFF2-40B4-BE49-F238E27FC236}">
+                <a16:creationId xmlns:a16="http://schemas.microsoft.com/office/drawing/2014/main" id="{CAA2BECE-76B4-42D9-A606-D8716172B8D1}"/>
+              </a:ext>
+            </a:extLst>
+          </p:cNvPr>
+          <p:cNvSpPr/>
+          <p:nvPr/>
+        </p:nvSpPr>
+        <p:spPr>
+          <a:xfrm rot="3745953">
+            <a:off x="3723819" y="3434351"/>
+            <a:ext cx="532661" cy="585926"/>
+          </a:xfrm>
+          <a:prstGeom prst="downArrow">
+            <a:avLst/>
+          </a:prstGeom>
+        </p:spPr>
+        <p:style>
+          <a:lnRef idx="2">
+            <a:schemeClr val="accent1">
+              <a:shade val="50000"/>
+            </a:schemeClr>
+          </a:lnRef>
+          <a:fillRef idx="1">
+            <a:schemeClr val="accent1"/>
+          </a:fillRef>
+          <a:effectRef idx="0">
+            <a:schemeClr val="accent1"/>
+          </a:effectRef>
+          <a:fontRef idx="minor">
+            <a:schemeClr val="lt1"/>
+          </a:fontRef>
+        </p:style>
+        <p:txBody>
+          <a:bodyPr rtlCol="0" anchor="ctr"/>
+          <a:lstStyle/>
+          <a:p>
+            <a:pPr algn="ctr"/>
+            <a:endParaRPr lang="en-GB"/>
+          </a:p>
+        </p:txBody>
+      </p:sp>
+      <p:pic>
+        <p:nvPicPr>
+          <p:cNvPr id="6" name="Immagine 5">
+            <a:extLst>
+              <a:ext uri="{FF2B5EF4-FFF2-40B4-BE49-F238E27FC236}">
+                <a16:creationId xmlns:a16="http://schemas.microsoft.com/office/drawing/2014/main" id="{33A329D6-EAE5-4B03-8176-5B14A2099212}"/>
+              </a:ext>
+            </a:extLst>
+          </p:cNvPr>
+          <p:cNvPicPr>
+            <a:picLocks noChangeAspect="1"/>
+          </p:cNvPicPr>
+          <p:nvPr/>
+        </p:nvPicPr>
+        <p:blipFill>
+          <a:blip r:embed="rId10">
+            <a:extLst>
+              <a:ext uri="{28A0092B-C50C-407E-A947-70E740481C1C}">
+                <a14:useLocalDpi xmlns:a14="http://schemas.microsoft.com/office/drawing/2010/main" val="0"/>
+              </a:ext>
+            </a:extLst>
+          </a:blip>
+          <a:stretch>
+            <a:fillRect/>
+          </a:stretch>
+        </p:blipFill>
+        <p:spPr>
+          <a:xfrm>
+            <a:off x="10501326" y="3389996"/>
+            <a:ext cx="944340" cy="944340"/>
+          </a:xfrm>
+          <a:prstGeom prst="rect">
+            <a:avLst/>
+          </a:prstGeom>
+        </p:spPr>
+      </p:pic>
+      <p:sp>
+        <p:nvSpPr>
+          <p:cNvPr id="24" name="Freccia in giù 23">
+            <a:extLst>
+              <a:ext uri="{FF2B5EF4-FFF2-40B4-BE49-F238E27FC236}">
+                <a16:creationId xmlns:a16="http://schemas.microsoft.com/office/drawing/2014/main" id="{5E352063-D29B-4B7F-A327-E72D734E1E9F}"/>
+              </a:ext>
+            </a:extLst>
+          </p:cNvPr>
+          <p:cNvSpPr/>
+          <p:nvPr/>
+        </p:nvSpPr>
+        <p:spPr>
+          <a:xfrm rot="16200000">
+            <a:off x="9758075" y="3565903"/>
+            <a:ext cx="532661" cy="585926"/>
+          </a:xfrm>
+          <a:prstGeom prst="downArrow">
+            <a:avLst/>
+          </a:prstGeom>
+        </p:spPr>
+        <p:style>
+          <a:lnRef idx="2">
+            <a:schemeClr val="accent1">
+              <a:shade val="50000"/>
+            </a:schemeClr>
+          </a:lnRef>
+          <a:fillRef idx="1">
+            <a:schemeClr val="accent1"/>
+          </a:fillRef>
+          <a:effectRef idx="0">
+            <a:schemeClr val="accent1"/>
+          </a:effectRef>
+          <a:fontRef idx="minor">
+            <a:schemeClr val="lt1"/>
+          </a:fontRef>
+        </p:style>
+        <p:txBody>
+          <a:bodyPr rtlCol="0" anchor="ctr"/>
+          <a:lstStyle/>
+          <a:p>
+            <a:pPr algn="ctr"/>
+            <a:endParaRPr lang="en-GB" dirty="0"/>
+          </a:p>
+        </p:txBody>
+      </p:sp>
+      <p:sp>
+        <p:nvSpPr>
+          <p:cNvPr id="22" name="Segno di addizione 21">
+            <a:extLst>
+              <a:ext uri="{FF2B5EF4-FFF2-40B4-BE49-F238E27FC236}">
+                <a16:creationId xmlns:a16="http://schemas.microsoft.com/office/drawing/2014/main" id="{96979F25-0B89-4464-8D4A-894280E56AED}"/>
+              </a:ext>
+            </a:extLst>
+          </p:cNvPr>
+          <p:cNvSpPr/>
+          <p:nvPr/>
+        </p:nvSpPr>
+        <p:spPr>
+          <a:xfrm>
+            <a:off x="10798212" y="4509876"/>
+            <a:ext cx="343949" cy="293615"/>
+          </a:xfrm>
+          <a:prstGeom prst="mathPlus">
+            <a:avLst/>
+          </a:prstGeom>
+        </p:spPr>
+        <p:style>
+          <a:lnRef idx="2">
+            <a:schemeClr val="accent1">
+              <a:shade val="50000"/>
+            </a:schemeClr>
+          </a:lnRef>
+          <a:fillRef idx="1">
+            <a:schemeClr val="accent1"/>
+          </a:fillRef>
+          <a:effectRef idx="0">
+            <a:schemeClr val="accent1"/>
+          </a:effectRef>
+          <a:fontRef idx="minor">
+            <a:schemeClr val="lt1"/>
+          </a:fontRef>
+        </p:style>
+        <p:txBody>
+          <a:bodyPr rtlCol="0" anchor="ctr"/>
+          <a:lstStyle/>
+          <a:p>
+            <a:pPr algn="ctr"/>
+            <a:endParaRPr lang="en-GB"/>
+          </a:p>
+        </p:txBody>
+      </p:sp>
+      <p:pic>
+        <p:nvPicPr>
+          <p:cNvPr id="25" name="Immagine 24" descr="Immagine che contiene testo, orologio, clipart&#10;&#10;Descrizione generata automaticamente">
+            <a:extLst>
+              <a:ext uri="{FF2B5EF4-FFF2-40B4-BE49-F238E27FC236}">
+                <a16:creationId xmlns:a16="http://schemas.microsoft.com/office/drawing/2014/main" id="{825BEFDE-A1A4-431B-A58F-3D9D1AAF5925}"/>
+              </a:ext>
+            </a:extLst>
+          </p:cNvPr>
+          <p:cNvPicPr>
+            <a:picLocks noChangeAspect="1"/>
+          </p:cNvPicPr>
+          <p:nvPr/>
+        </p:nvPicPr>
+        <p:blipFill>
+          <a:blip r:embed="rId11">
+            <a:extLst>
+              <a:ext uri="{28A0092B-C50C-407E-A947-70E740481C1C}">
+                <a14:useLocalDpi xmlns:a14="http://schemas.microsoft.com/office/drawing/2010/main" val="0"/>
+              </a:ext>
+            </a:extLst>
+          </a:blip>
+          <a:stretch>
+            <a:fillRect/>
+          </a:stretch>
+        </p:blipFill>
+        <p:spPr>
+          <a:xfrm>
+            <a:off x="10202416" y="4942192"/>
+            <a:ext cx="1535542" cy="356328"/>
+          </a:xfrm>
+          <a:prstGeom prst="rect">
+            <a:avLst/>
+          </a:prstGeom>
+        </p:spPr>
+      </p:pic>
+      <p:pic>
+        <p:nvPicPr>
+          <p:cNvPr id="26" name="Immagine 25">
+            <a:extLst>
+              <a:ext uri="{FF2B5EF4-FFF2-40B4-BE49-F238E27FC236}">
+                <a16:creationId xmlns:a16="http://schemas.microsoft.com/office/drawing/2014/main" id="{4DD4F4F6-97AF-44A4-9437-AE51998A85E2}"/>
+              </a:ext>
+            </a:extLst>
+          </p:cNvPr>
+          <p:cNvPicPr>
+            <a:picLocks noChangeAspect="1"/>
+          </p:cNvPicPr>
+          <p:nvPr/>
+        </p:nvPicPr>
+        <p:blipFill>
+          <a:blip r:embed="rId12">
+            <a:extLst>
+              <a:ext uri="{28A0092B-C50C-407E-A947-70E740481C1C}">
+                <a14:useLocalDpi xmlns:a14="http://schemas.microsoft.com/office/drawing/2010/main" val="0"/>
+              </a:ext>
+            </a:extLst>
+          </a:blip>
+          <a:stretch>
+            <a:fillRect/>
+          </a:stretch>
+        </p:blipFill>
+        <p:spPr>
+          <a:xfrm>
+            <a:off x="849541" y="5192911"/>
+            <a:ext cx="1396401" cy="640927"/>
+          </a:xfrm>
+          <a:prstGeom prst="rect">
+            <a:avLst/>
+          </a:prstGeom>
+        </p:spPr>
+      </p:pic>
+      <p:sp>
+        <p:nvSpPr>
+          <p:cNvPr id="27" name="Segno di addizione 26">
+            <a:extLst>
+              <a:ext uri="{FF2B5EF4-FFF2-40B4-BE49-F238E27FC236}">
+                <a16:creationId xmlns:a16="http://schemas.microsoft.com/office/drawing/2014/main" id="{827F9757-C496-4EA7-A2E9-84B2F5A6BE3F}"/>
+              </a:ext>
+            </a:extLst>
+          </p:cNvPr>
+          <p:cNvSpPr/>
+          <p:nvPr/>
+        </p:nvSpPr>
+        <p:spPr>
+          <a:xfrm>
+            <a:off x="1308499" y="4814197"/>
+            <a:ext cx="343949" cy="293615"/>
+          </a:xfrm>
+          <a:prstGeom prst="mathPlus">
+            <a:avLst/>
+          </a:prstGeom>
+        </p:spPr>
+        <p:style>
+          <a:lnRef idx="2">
+            <a:schemeClr val="accent1">
+              <a:shade val="50000"/>
+            </a:schemeClr>
+          </a:lnRef>
+          <a:fillRef idx="1">
+            <a:schemeClr val="accent1"/>
+          </a:fillRef>
+          <a:effectRef idx="0">
+            <a:schemeClr val="accent1"/>
+          </a:effectRef>
+          <a:fontRef idx="minor">
+            <a:schemeClr val="lt1"/>
+          </a:fontRef>
+        </p:style>
+        <p:txBody>
+          <a:bodyPr rtlCol="0" anchor="ctr"/>
+          <a:lstStyle/>
+          <a:p>
+            <a:pPr algn="ctr"/>
+            <a:endParaRPr lang="en-GB"/>
+          </a:p>
+        </p:txBody>
+      </p:sp>
+    </p:spTree>
+    <p:extLst>
+      <p:ext uri="{BB962C8B-B14F-4D97-AF65-F5344CB8AC3E}">
+        <p14:creationId xmlns:p14="http://schemas.microsoft.com/office/powerpoint/2010/main" val="1474905446"/>
       </p:ext>
     </p:extLst>
   </p:cSld>

</xml_diff>